<commit_message>
updated session 07 materials
</commit_message>
<xml_diff>
--- a/Session_07_FeatureEngineering_and_CrossValidation/Session7_FeatureEngineering_CrossValidation.pptx
+++ b/Session_07_FeatureEngineering_and_CrossValidation/Session7_FeatureEngineering_CrossValidation.pptx
@@ -6604,7 +6604,7 @@
           <a:p>
             <a:r>
               <a:rPr lang="en-US" dirty="0"/>
-              <a:t>Improving upon test/train methodology</a:t>
+              <a:t>Improving upon train/test methodology</a:t>
             </a:r>
           </a:p>
         </p:txBody>
@@ -7578,15 +7578,7 @@
             </a:pPr>
             <a:r>
               <a:rPr lang="en-US" dirty="0"/>
-              <a:t>MSE is calculated on the hold </a:t>
-            </a:r>
-            <a:r>
-              <a:rPr lang="en-US" dirty="0" err="1"/>
-              <a:t>olut</a:t>
-            </a:r>
-            <a:r>
-              <a:rPr lang="en-US" dirty="0"/>
-              <a:t> fold</a:t>
+              <a:t>MSE is calculated on the hold out fold</a:t>
             </a:r>
           </a:p>
           <a:p>
@@ -8261,7 +8253,7 @@
             </a:r>
             <a:r>
               <a:rPr lang="en-US" dirty="0"/>
-              <a:t>than the man of many quantities that are not as highly correlated</a:t>
+              <a:t>than the mean of many quantities that are not as highly correlated</a:t>
             </a:r>
           </a:p>
           <a:p>

</xml_diff>